<commit_message>
revise location of box
</commit_message>
<xml_diff>
--- a/presentation/X5GON-Team 4.pptx
+++ b/presentation/X5GON-Team 4.pptx
@@ -1059,13 +1059,13 @@
   <p:clrMapOvr>
     <a:masterClrMapping/>
   </p:clrMapOvr>
-  <mc:AlternateContent xmlns:mc="http://schemas.openxmlformats.org/markup-compatibility/2006">
-    <mc:Choice xmlns:p14="http://schemas.microsoft.com/office/powerpoint/2010/main" Requires="p14">
+  <mc:AlternateContent xmlns:mc="http://schemas.openxmlformats.org/markup-compatibility/2006" xmlns:p14="http://schemas.microsoft.com/office/powerpoint/2010/main">
+    <mc:Choice Requires="p14">
       <p:transition spd="med" p14:dur="700">
         <p:fade/>
       </p:transition>
     </mc:Choice>
-    <mc:Fallback>
+    <mc:Fallback xmlns="">
       <p:transition spd="med">
         <p:fade/>
       </p:transition>
@@ -1253,13 +1253,13 @@
   <p:clrMapOvr>
     <a:masterClrMapping/>
   </p:clrMapOvr>
-  <mc:AlternateContent xmlns:mc="http://schemas.openxmlformats.org/markup-compatibility/2006">
-    <mc:Choice xmlns:p14="http://schemas.microsoft.com/office/powerpoint/2010/main" Requires="p14">
+  <mc:AlternateContent xmlns:mc="http://schemas.openxmlformats.org/markup-compatibility/2006" xmlns:p14="http://schemas.microsoft.com/office/powerpoint/2010/main">
+    <mc:Choice Requires="p14">
       <p:transition spd="med" p14:dur="700">
         <p:fade/>
       </p:transition>
     </mc:Choice>
-    <mc:Fallback>
+    <mc:Fallback xmlns="">
       <p:transition spd="med">
         <p:fade/>
       </p:transition>
@@ -1654,13 +1654,13 @@
   <p:clrMapOvr>
     <a:masterClrMapping/>
   </p:clrMapOvr>
-  <mc:AlternateContent xmlns:mc="http://schemas.openxmlformats.org/markup-compatibility/2006">
-    <mc:Choice xmlns:p14="http://schemas.microsoft.com/office/powerpoint/2010/main" Requires="p14">
+  <mc:AlternateContent xmlns:mc="http://schemas.openxmlformats.org/markup-compatibility/2006" xmlns:p14="http://schemas.microsoft.com/office/powerpoint/2010/main">
+    <mc:Choice Requires="p14">
       <p:transition spd="med" p14:dur="700">
         <p:fade/>
       </p:transition>
     </mc:Choice>
-    <mc:Fallback>
+    <mc:Fallback xmlns="">
       <p:transition spd="med">
         <p:fade/>
       </p:transition>
@@ -1707,13 +1707,13 @@
   <p:clrMapOvr>
     <a:masterClrMapping/>
   </p:clrMapOvr>
-  <mc:AlternateContent xmlns:mc="http://schemas.openxmlformats.org/markup-compatibility/2006">
-    <mc:Choice xmlns:p14="http://schemas.microsoft.com/office/powerpoint/2010/main" Requires="p14">
+  <mc:AlternateContent xmlns:mc="http://schemas.openxmlformats.org/markup-compatibility/2006" xmlns:p14="http://schemas.microsoft.com/office/powerpoint/2010/main">
+    <mc:Choice Requires="p14">
       <p:transition spd="med" p14:dur="700">
         <p:fade/>
       </p:transition>
     </mc:Choice>
-    <mc:Fallback>
+    <mc:Fallback xmlns="">
       <p:transition spd="med">
         <p:fade/>
       </p:transition>
@@ -1996,13 +1996,13 @@
   <p:clrMapOvr>
     <a:masterClrMapping/>
   </p:clrMapOvr>
-  <mc:AlternateContent xmlns:mc="http://schemas.openxmlformats.org/markup-compatibility/2006">
-    <mc:Choice xmlns:p14="http://schemas.microsoft.com/office/powerpoint/2010/main" Requires="p14">
+  <mc:AlternateContent xmlns:mc="http://schemas.openxmlformats.org/markup-compatibility/2006" xmlns:p14="http://schemas.microsoft.com/office/powerpoint/2010/main">
+    <mc:Choice Requires="p14">
       <p:transition spd="med" p14:dur="700">
         <p:fade/>
       </p:transition>
     </mc:Choice>
-    <mc:Fallback>
+    <mc:Fallback xmlns="">
       <p:transition spd="med">
         <p:fade/>
       </p:transition>
@@ -2265,13 +2265,13 @@
   <p:clrMapOvr>
     <a:masterClrMapping/>
   </p:clrMapOvr>
-  <mc:AlternateContent xmlns:mc="http://schemas.openxmlformats.org/markup-compatibility/2006">
-    <mc:Choice xmlns:p14="http://schemas.microsoft.com/office/powerpoint/2010/main" Requires="p14">
+  <mc:AlternateContent xmlns:mc="http://schemas.openxmlformats.org/markup-compatibility/2006" xmlns:p14="http://schemas.microsoft.com/office/powerpoint/2010/main">
+    <mc:Choice Requires="p14">
       <p:transition spd="med" p14:dur="700">
         <p:fade/>
       </p:transition>
     </mc:Choice>
-    <mc:Fallback>
+    <mc:Fallback xmlns="">
       <p:transition spd="med">
         <p:fade/>
       </p:transition>
@@ -2447,13 +2447,13 @@
   <p:clrMapOvr>
     <a:masterClrMapping/>
   </p:clrMapOvr>
-  <mc:AlternateContent xmlns:mc="http://schemas.openxmlformats.org/markup-compatibility/2006">
-    <mc:Choice xmlns:p14="http://schemas.microsoft.com/office/powerpoint/2010/main" Requires="p14">
+  <mc:AlternateContent xmlns:mc="http://schemas.openxmlformats.org/markup-compatibility/2006" xmlns:p14="http://schemas.microsoft.com/office/powerpoint/2010/main">
+    <mc:Choice Requires="p14">
       <p:transition spd="med" p14:dur="700">
         <p:fade/>
       </p:transition>
     </mc:Choice>
-    <mc:Fallback>
+    <mc:Fallback xmlns="">
       <p:transition spd="med">
         <p:fade/>
       </p:transition>
@@ -2639,13 +2639,13 @@
   <p:clrMapOvr>
     <a:masterClrMapping/>
   </p:clrMapOvr>
-  <mc:AlternateContent xmlns:mc="http://schemas.openxmlformats.org/markup-compatibility/2006">
-    <mc:Choice xmlns:p14="http://schemas.microsoft.com/office/powerpoint/2010/main" Requires="p14">
+  <mc:AlternateContent xmlns:mc="http://schemas.openxmlformats.org/markup-compatibility/2006" xmlns:p14="http://schemas.microsoft.com/office/powerpoint/2010/main">
+    <mc:Choice Requires="p14">
       <p:transition spd="med" p14:dur="700">
         <p:fade/>
       </p:transition>
     </mc:Choice>
-    <mc:Fallback>
+    <mc:Fallback xmlns="">
       <p:transition spd="med">
         <p:fade/>
       </p:transition>
@@ -2911,13 +2911,13 @@
     <p:sldLayoutId id="2147483670" r:id="rId7"/>
     <p:sldLayoutId id="2147483671" r:id="rId8"/>
   </p:sldLayoutIdLst>
-  <mc:AlternateContent xmlns:mc="http://schemas.openxmlformats.org/markup-compatibility/2006">
-    <mc:Choice xmlns:p14="http://schemas.microsoft.com/office/powerpoint/2010/main" Requires="p14">
+  <mc:AlternateContent xmlns:mc="http://schemas.openxmlformats.org/markup-compatibility/2006" xmlns:p14="http://schemas.microsoft.com/office/powerpoint/2010/main">
+    <mc:Choice Requires="p14">
       <p:transition spd="med" p14:dur="700">
         <p:fade/>
       </p:transition>
     </mc:Choice>
-    <mc:Fallback>
+    <mc:Fallback xmlns="">
       <p:transition spd="med">
         <p:fade/>
       </p:transition>
@@ -3458,13 +3458,13 @@
   <p:clrMapOvr>
     <a:masterClrMapping/>
   </p:clrMapOvr>
-  <mc:AlternateContent xmlns:mc="http://schemas.openxmlformats.org/markup-compatibility/2006">
-    <mc:Choice xmlns:p14="http://schemas.microsoft.com/office/powerpoint/2010/main" Requires="p14">
+  <mc:AlternateContent xmlns:mc="http://schemas.openxmlformats.org/markup-compatibility/2006" xmlns:p14="http://schemas.microsoft.com/office/powerpoint/2010/main">
+    <mc:Choice Requires="p14">
       <p:transition spd="med" p14:dur="700">
         <p:fade/>
       </p:transition>
     </mc:Choice>
-    <mc:Fallback>
+    <mc:Fallback xmlns="">
       <p:transition spd="med">
         <p:fade/>
       </p:transition>
@@ -6245,13 +6245,13 @@
   <p:clrMapOvr>
     <a:masterClrMapping/>
   </p:clrMapOvr>
-  <mc:AlternateContent xmlns:mc="http://schemas.openxmlformats.org/markup-compatibility/2006">
-    <mc:Choice xmlns:p14="http://schemas.microsoft.com/office/powerpoint/2010/main" Requires="p14">
+  <mc:AlternateContent xmlns:mc="http://schemas.openxmlformats.org/markup-compatibility/2006" xmlns:p14="http://schemas.microsoft.com/office/powerpoint/2010/main">
+    <mc:Choice Requires="p14">
       <p:transition spd="med" p14:dur="700">
         <p:fade/>
       </p:transition>
     </mc:Choice>
-    <mc:Fallback>
+    <mc:Fallback xmlns="">
       <p:transition spd="med">
         <p:fade/>
       </p:transition>
@@ -7143,9 +7143,9 @@
         <p:grpSpPr>
           <a:xfrm>
             <a:off x="144419" y="2873395"/>
-            <a:ext cx="2187479" cy="1865975"/>
+            <a:ext cx="2187477" cy="1865975"/>
             <a:chOff x="375331" y="2887280"/>
-            <a:chExt cx="2187479" cy="1865975"/>
+            <a:chExt cx="2187477" cy="1865975"/>
           </a:xfrm>
         </p:grpSpPr>
         <p:sp>
@@ -7335,7 +7335,7 @@
           </p:nvSpPr>
           <p:spPr>
             <a:xfrm>
-              <a:off x="382589" y="3325091"/>
+              <a:off x="382587" y="3352015"/>
               <a:ext cx="2180221" cy="1323439"/>
             </a:xfrm>
             <a:prstGeom prst="rect">
@@ -7656,10 +7656,10 @@
         </p:nvGrpSpPr>
         <p:grpSpPr>
           <a:xfrm>
-            <a:off x="4330160" y="2896890"/>
-            <a:ext cx="2481944" cy="1849377"/>
-            <a:chOff x="4572000" y="2889993"/>
-            <a:chExt cx="2481944" cy="1849377"/>
+            <a:off x="4324738" y="2896890"/>
+            <a:ext cx="2487366" cy="1849377"/>
+            <a:chOff x="4566578" y="2889993"/>
+            <a:chExt cx="2487366" cy="1849377"/>
           </a:xfrm>
         </p:grpSpPr>
         <p:sp>
@@ -7849,7 +7849,7 @@
           </p:nvSpPr>
           <p:spPr>
             <a:xfrm>
-              <a:off x="4572000" y="3242431"/>
+              <a:off x="4566578" y="3341528"/>
               <a:ext cx="2481944" cy="1323439"/>
             </a:xfrm>
             <a:prstGeom prst="rect">
@@ -8668,13 +8668,13 @@
   <p:clrMapOvr>
     <a:masterClrMapping/>
   </p:clrMapOvr>
-  <mc:AlternateContent xmlns:mc="http://schemas.openxmlformats.org/markup-compatibility/2006">
-    <mc:Choice xmlns:p14="http://schemas.microsoft.com/office/powerpoint/2010/main" Requires="p14">
+  <mc:AlternateContent xmlns:mc="http://schemas.openxmlformats.org/markup-compatibility/2006" xmlns:p14="http://schemas.microsoft.com/office/powerpoint/2010/main">
+    <mc:Choice Requires="p14">
       <p:transition spd="med" p14:dur="700">
         <p:fade/>
       </p:transition>
     </mc:Choice>
-    <mc:Fallback>
+    <mc:Fallback xmlns="">
       <p:transition spd="med">
         <p:fade/>
       </p:transition>

</xml_diff>